<commit_message>
curator gallery frontend and curator gallery minting functionality
</commit_message>
<xml_diff>
--- a/CodeZilla'25_Sea_King_Inter_Ships.pptx
+++ b/CodeZilla'25_Sea_King_Inter_Ships.pptx
@@ -9491,21 +9491,21 @@
                 <a:latin typeface="Poppins" panose="00000500000000000000" pitchFamily="2" charset="0"/>
                 <a:cs typeface="Poppins" panose="00000500000000000000" pitchFamily="2" charset="0"/>
               </a:rPr>
-              <a:t>has been completed. Frontend in its </a:t>
-            </a:r>
-            <a:r>
-              <a:rPr lang="en-US" sz="3200" dirty="0" err="1">
-                <a:latin typeface="Poppins" panose="00000500000000000000" pitchFamily="2" charset="0"/>
-                <a:cs typeface="Poppins" panose="00000500000000000000" pitchFamily="2" charset="0"/>
-              </a:rPr>
-              <a:t>entirerity</a:t>
+              <a:t>has been completed. Frontend in </a:t>
+            </a:r>
+            <a:r>
+              <a:rPr lang="en-US" sz="3200">
+                <a:latin typeface="Poppins" panose="00000500000000000000" pitchFamily="2" charset="0"/>
+                <a:cs typeface="Poppins" panose="00000500000000000000" pitchFamily="2" charset="0"/>
+              </a:rPr>
+              <a:t>its entirety </a:t>
             </a:r>
             <a:r>
               <a:rPr lang="en-US" sz="3200" dirty="0">
                 <a:latin typeface="Poppins" panose="00000500000000000000" pitchFamily="2" charset="0"/>
                 <a:cs typeface="Poppins" panose="00000500000000000000" pitchFamily="2" charset="0"/>
               </a:rPr>
-              <a:t> has been completed for web application and mobile application both</a:t>
+              <a:t>has been completed for web application and mobile application both</a:t>
             </a:r>
           </a:p>
           <a:p>

</xml_diff>